<commit_message>
Add basic box model
</commit_message>
<xml_diff>
--- a/design.pptx
+++ b/design.pptx
@@ -104,6 +104,11 @@
       </a:defRPr>
     </a:lvl9pPr>
   </p:defaultTextStyle>
+  <p:extLst>
+    <p:ext uri="{EFAFB233-063F-42B5-8137-9DF3F51BA10A}">
+      <p15:sldGuideLst xmlns:p15="http://schemas.microsoft.com/office/powerpoint/2012/main"/>
+    </p:ext>
+  </p:extLst>
 </p:presentation>
 </file>
 
@@ -111,23 +116,39 @@
 <pc:chgInfo xmlns:a="http://schemas.openxmlformats.org/drawingml/2006/main" xmlns:r="http://schemas.openxmlformats.org/officeDocument/2006/relationships" xmlns:ac="http://schemas.microsoft.com/office/drawing/2013/main/command" xmlns:pc="http://schemas.microsoft.com/office/powerpoint/2013/main/command">
   <pc:docChgLst>
     <pc:chgData name="Davi Henrique de Sousa Pinto" userId="d2a4d29bb236bca9" providerId="LiveId" clId="{7848FFE6-BC05-45BD-B306-E88C79E330FB}"/>
-    <pc:docChg chg="modSld">
-      <pc:chgData name="Davi Henrique de Sousa Pinto" userId="d2a4d29bb236bca9" providerId="LiveId" clId="{7848FFE6-BC05-45BD-B306-E88C79E330FB}" dt="2020-04-23T22:22:49.662" v="1" actId="1076"/>
+    <pc:docChg chg="custSel modSld">
+      <pc:chgData name="Davi Henrique de Sousa Pinto" userId="d2a4d29bb236bca9" providerId="LiveId" clId="{7848FFE6-BC05-45BD-B306-E88C79E330FB}" dt="2020-04-24T19:14:52.966" v="85" actId="1076"/>
       <pc:docMkLst>
         <pc:docMk/>
       </pc:docMkLst>
-      <pc:sldChg chg="modSp">
-        <pc:chgData name="Davi Henrique de Sousa Pinto" userId="d2a4d29bb236bca9" providerId="LiveId" clId="{7848FFE6-BC05-45BD-B306-E88C79E330FB}" dt="2020-04-23T22:22:49.662" v="1" actId="1076"/>
+      <pc:sldChg chg="delSp modSp">
+        <pc:chgData name="Davi Henrique de Sousa Pinto" userId="d2a4d29bb236bca9" providerId="LiveId" clId="{7848FFE6-BC05-45BD-B306-E88C79E330FB}" dt="2020-04-24T19:14:52.966" v="85" actId="1076"/>
         <pc:sldMkLst>
           <pc:docMk/>
           <pc:sldMk cId="3646139391" sldId="256"/>
         </pc:sldMkLst>
+        <pc:spChg chg="del mod">
+          <ac:chgData name="Davi Henrique de Sousa Pinto" userId="d2a4d29bb236bca9" providerId="LiveId" clId="{7848FFE6-BC05-45BD-B306-E88C79E330FB}" dt="2020-04-24T19:14:44.453" v="81" actId="478"/>
+          <ac:spMkLst>
+            <pc:docMk/>
+            <pc:sldMk cId="3646139391" sldId="256"/>
+            <ac:spMk id="9" creationId="{E074F6FF-D230-4FF9-94A6-2FBF03AC17AC}"/>
+          </ac:spMkLst>
+        </pc:spChg>
         <pc:spChg chg="mod">
           <ac:chgData name="Davi Henrique de Sousa Pinto" userId="d2a4d29bb236bca9" providerId="LiveId" clId="{7848FFE6-BC05-45BD-B306-E88C79E330FB}" dt="2020-04-23T22:22:49.662" v="1" actId="1076"/>
           <ac:spMkLst>
             <pc:docMk/>
             <pc:sldMk cId="3646139391" sldId="256"/>
             <ac:spMk id="24" creationId="{948E5EDE-0E78-433B-A054-83F48D1FF1B5}"/>
+          </ac:spMkLst>
+        </pc:spChg>
+        <pc:spChg chg="mod">
+          <ac:chgData name="Davi Henrique de Sousa Pinto" userId="d2a4d29bb236bca9" providerId="LiveId" clId="{7848FFE6-BC05-45BD-B306-E88C79E330FB}" dt="2020-04-24T19:14:52.966" v="85" actId="1076"/>
+          <ac:spMkLst>
+            <pc:docMk/>
+            <pc:sldMk cId="3646139391" sldId="256"/>
+            <ac:spMk id="29" creationId="{A5EA3C9B-3831-4E15-B858-847B1763D34E}"/>
           </ac:spMkLst>
         </pc:spChg>
       </pc:sldChg>
@@ -283,7 +304,7 @@
           <a:p>
             <a:fld id="{BA933363-D49F-4586-A43B-DA36834322A2}" type="datetimeFigureOut">
               <a:rPr lang="en-US" smtClean="0"/>
-              <a:t>4/23/2020</a:t>
+              <a:t>4/24/2020</a:t>
             </a:fld>
             <a:endParaRPr lang="en-US"/>
           </a:p>
@@ -481,7 +502,7 @@
           <a:p>
             <a:fld id="{BA933363-D49F-4586-A43B-DA36834322A2}" type="datetimeFigureOut">
               <a:rPr lang="en-US" smtClean="0"/>
-              <a:t>4/23/2020</a:t>
+              <a:t>4/24/2020</a:t>
             </a:fld>
             <a:endParaRPr lang="en-US"/>
           </a:p>
@@ -689,7 +710,7 @@
           <a:p>
             <a:fld id="{BA933363-D49F-4586-A43B-DA36834322A2}" type="datetimeFigureOut">
               <a:rPr lang="en-US" smtClean="0"/>
-              <a:t>4/23/2020</a:t>
+              <a:t>4/24/2020</a:t>
             </a:fld>
             <a:endParaRPr lang="en-US"/>
           </a:p>
@@ -887,7 +908,7 @@
           <a:p>
             <a:fld id="{BA933363-D49F-4586-A43B-DA36834322A2}" type="datetimeFigureOut">
               <a:rPr lang="en-US" smtClean="0"/>
-              <a:t>4/23/2020</a:t>
+              <a:t>4/24/2020</a:t>
             </a:fld>
             <a:endParaRPr lang="en-US"/>
           </a:p>
@@ -1162,7 +1183,7 @@
           <a:p>
             <a:fld id="{BA933363-D49F-4586-A43B-DA36834322A2}" type="datetimeFigureOut">
               <a:rPr lang="en-US" smtClean="0"/>
-              <a:t>4/23/2020</a:t>
+              <a:t>4/24/2020</a:t>
             </a:fld>
             <a:endParaRPr lang="en-US"/>
           </a:p>
@@ -1427,7 +1448,7 @@
           <a:p>
             <a:fld id="{BA933363-D49F-4586-A43B-DA36834322A2}" type="datetimeFigureOut">
               <a:rPr lang="en-US" smtClean="0"/>
-              <a:t>4/23/2020</a:t>
+              <a:t>4/24/2020</a:t>
             </a:fld>
             <a:endParaRPr lang="en-US"/>
           </a:p>
@@ -1839,7 +1860,7 @@
           <a:p>
             <a:fld id="{BA933363-D49F-4586-A43B-DA36834322A2}" type="datetimeFigureOut">
               <a:rPr lang="en-US" smtClean="0"/>
-              <a:t>4/23/2020</a:t>
+              <a:t>4/24/2020</a:t>
             </a:fld>
             <a:endParaRPr lang="en-US"/>
           </a:p>
@@ -1980,7 +2001,7 @@
           <a:p>
             <a:fld id="{BA933363-D49F-4586-A43B-DA36834322A2}" type="datetimeFigureOut">
               <a:rPr lang="en-US" smtClean="0"/>
-              <a:t>4/23/2020</a:t>
+              <a:t>4/24/2020</a:t>
             </a:fld>
             <a:endParaRPr lang="en-US"/>
           </a:p>
@@ -2093,7 +2114,7 @@
           <a:p>
             <a:fld id="{BA933363-D49F-4586-A43B-DA36834322A2}" type="datetimeFigureOut">
               <a:rPr lang="en-US" smtClean="0"/>
-              <a:t>4/23/2020</a:t>
+              <a:t>4/24/2020</a:t>
             </a:fld>
             <a:endParaRPr lang="en-US"/>
           </a:p>
@@ -2404,7 +2425,7 @@
           <a:p>
             <a:fld id="{BA933363-D49F-4586-A43B-DA36834322A2}" type="datetimeFigureOut">
               <a:rPr lang="en-US" smtClean="0"/>
-              <a:t>4/23/2020</a:t>
+              <a:t>4/24/2020</a:t>
             </a:fld>
             <a:endParaRPr lang="en-US"/>
           </a:p>
@@ -2692,7 +2713,7 @@
           <a:p>
             <a:fld id="{BA933363-D49F-4586-A43B-DA36834322A2}" type="datetimeFigureOut">
               <a:rPr lang="en-US" smtClean="0"/>
-              <a:t>4/23/2020</a:t>
+              <a:t>4/24/2020</a:t>
             </a:fld>
             <a:endParaRPr lang="en-US"/>
           </a:p>
@@ -2933,7 +2954,7 @@
           <a:p>
             <a:fld id="{BA933363-D49F-4586-A43B-DA36834322A2}" type="datetimeFigureOut">
               <a:rPr lang="en-US" smtClean="0"/>
-              <a:t>4/23/2020</a:t>
+              <a:t>4/24/2020</a:t>
             </a:fld>
             <a:endParaRPr lang="en-US"/>
           </a:p>
@@ -3542,56 +3563,6 @@
       </p:sp>
       <p:sp>
         <p:nvSpPr>
-          <p:cNvPr id="9" name="TextBox 8">
-            <a:extLst>
-              <a:ext uri="{FF2B5EF4-FFF2-40B4-BE49-F238E27FC236}">
-                <a16:creationId xmlns:a16="http://schemas.microsoft.com/office/drawing/2014/main" id="{E074F6FF-D230-4FF9-94A6-2FBF03AC17AC}"/>
-              </a:ext>
-            </a:extLst>
-          </p:cNvPr>
-          <p:cNvSpPr txBox="1"/>
-          <p:nvPr/>
-        </p:nvSpPr>
-        <p:spPr>
-          <a:xfrm>
-            <a:off x="6877577" y="785287"/>
-            <a:ext cx="1468073" cy="369332"/>
-          </a:xfrm>
-          <a:prstGeom prst="rect">
-            <a:avLst/>
-          </a:prstGeom>
-        </p:spPr>
-        <p:style>
-          <a:lnRef idx="2">
-            <a:schemeClr val="accent3">
-              <a:shade val="50000"/>
-            </a:schemeClr>
-          </a:lnRef>
-          <a:fillRef idx="1">
-            <a:schemeClr val="accent3"/>
-          </a:fillRef>
-          <a:effectRef idx="0">
-            <a:schemeClr val="accent3"/>
-          </a:effectRef>
-          <a:fontRef idx="minor">
-            <a:schemeClr val="lt1"/>
-          </a:fontRef>
-        </p:style>
-        <p:txBody>
-          <a:bodyPr wrap="square" rtlCol="0">
-            <a:spAutoFit/>
-          </a:bodyPr>
-          <a:lstStyle/>
-          <a:p>
-            <a:r>
-              <a:rPr lang="en-US" dirty="0"/>
-              <a:t>New Game</a:t>
-            </a:r>
-          </a:p>
-        </p:txBody>
-      </p:sp>
-      <p:sp>
-        <p:nvSpPr>
           <p:cNvPr id="23" name="TextBox 22">
             <a:extLst>
               <a:ext uri="{FF2B5EF4-FFF2-40B4-BE49-F238E27FC236}">
@@ -3821,8 +3792,8 @@
         </p:nvSpPr>
         <p:spPr>
           <a:xfrm>
-            <a:off x="864066" y="503339"/>
-            <a:ext cx="9630562" cy="1273526"/>
+            <a:off x="1637952" y="1110815"/>
+            <a:ext cx="8623883" cy="369332"/>
           </a:xfrm>
           <a:prstGeom prst="rect">
             <a:avLst/>
@@ -3835,7 +3806,10 @@
           </a:bodyPr>
           <a:lstStyle/>
           <a:p>
-            <a:endParaRPr lang="en-US" dirty="0"/>
+            <a:r>
+              <a:rPr lang="en-US" dirty="0"/>
+              <a:t>Rock, Paper and Scissors                					New Game</a:t>
+            </a:r>
           </a:p>
         </p:txBody>
       </p:sp>

</xml_diff>